<commit_message>
Improved NLP and added final slide.
</commit_message>
<xml_diff>
--- a/slides/xx_more_AI.pptx
+++ b/slides/xx_more_AI.pptx
@@ -5,7 +5,7 @@
     <p:sldMasterId id="2147483678" r:id="rId1"/>
   </p:sldMasterIdLst>
   <p:notesMasterIdLst>
-    <p:notesMasterId r:id="rId7"/>
+    <p:notesMasterId r:id="rId9"/>
   </p:notesMasterIdLst>
   <p:sldIdLst>
     <p:sldId id="257" r:id="rId2"/>
@@ -13,6 +13,8 @@
     <p:sldId id="259" r:id="rId4"/>
     <p:sldId id="260" r:id="rId5"/>
     <p:sldId id="258" r:id="rId6"/>
+    <p:sldId id="262" r:id="rId7"/>
+    <p:sldId id="264" r:id="rId8"/>
   </p:sldIdLst>
   <p:sldSz cx="9144000" cy="6858000" type="screen4x3"/>
   <p:notesSz cx="7315200" cy="9601200"/>
@@ -3618,7 +3620,7 @@
           <a:p>
             <a:fld id="{FDB68C03-DCF9-4B87-BBF6-8F2088376604}" type="datetimeFigureOut">
               <a:rPr lang="en-US" smtClean="0"/>
-              <a:t>12/7/2024</a:t>
+              <a:t>12/8/2024</a:t>
             </a:fld>
             <a:endParaRPr lang="en-US"/>
           </a:p>
@@ -4468,7 +4470,7 @@
           <a:p>
             <a:fld id="{FDB68C03-DCF9-4B87-BBF6-8F2088376604}" type="datetimeFigureOut">
               <a:rPr lang="en-US" smtClean="0"/>
-              <a:t>12/7/2024</a:t>
+              <a:t>12/8/2024</a:t>
             </a:fld>
             <a:endParaRPr lang="en-US"/>
           </a:p>
@@ -4749,7 +4751,7 @@
           <a:p>
             <a:fld id="{FDB68C03-DCF9-4B87-BBF6-8F2088376604}" type="datetimeFigureOut">
               <a:rPr lang="en-US" smtClean="0"/>
-              <a:t>12/7/2024</a:t>
+              <a:t>12/8/2024</a:t>
             </a:fld>
             <a:endParaRPr lang="en-US"/>
           </a:p>
@@ -7454,7 +7456,7 @@
 </file>
 
 <file path=ppt/slides/slide2.xml><?xml version="1.0" encoding="utf-8"?>
-<p:sld xmlns:a="http://schemas.openxmlformats.org/drawingml/2006/main" xmlns:r="http://schemas.openxmlformats.org/officeDocument/2006/relationships" xmlns:p="http://schemas.openxmlformats.org/presentationml/2006/main">
+<p:sld xmlns:a="http://schemas.openxmlformats.org/drawingml/2006/main" xmlns:r="http://schemas.openxmlformats.org/officeDocument/2006/relationships" xmlns:p="http://schemas.openxmlformats.org/presentationml/2006/main" show="0">
   <p:cSld>
     <p:spTree>
       <p:nvGrpSpPr>
@@ -7498,8 +7500,8 @@
           </a:p>
         </p:txBody>
       </p:sp>
-      <mc:AlternateContent xmlns:mc="http://schemas.openxmlformats.org/markup-compatibility/2006" xmlns:a14="http://schemas.microsoft.com/office/drawing/2010/main">
-        <mc:Choice Requires="a14">
+      <mc:AlternateContent xmlns:mc="http://schemas.openxmlformats.org/markup-compatibility/2006">
+        <mc:Choice xmlns:a14="http://schemas.microsoft.com/office/drawing/2010/main" Requires="a14">
           <p:sp>
             <p:nvSpPr>
               <p:cNvPr id="3" name="Content Placeholder 2">
@@ -7666,11 +7668,11 @@
                             </m:e>
                           </m:nary>
                           <m:r>
-                            <a:rPr lang="en-US" i="1">
+                            <a:rPr lang="en-US" b="0" i="1" smtClean="0">
                               <a:latin typeface="Cambria Math" panose="02040503050406030204" pitchFamily="18" charset="0"/>
                               <a:ea typeface="Cambria Math" panose="02040503050406030204" pitchFamily="18" charset="0"/>
                             </a:rPr>
-                            <m:t>𝑅</m:t>
+                            <m:t>𝑟</m:t>
                           </m:r>
                           <m:r>
                             <a:rPr lang="en-US" i="1">
@@ -7927,7 +7929,7 @@
             </p:txBody>
           </p:sp>
         </mc:Choice>
-        <mc:Fallback xmlns="">
+        <mc:Fallback>
           <p:sp>
             <p:nvSpPr>
               <p:cNvPr id="3" name="Content Placeholder 2">
@@ -8141,8 +8143,8 @@
           </p:txBody>
         </p:sp>
       </p:grpSp>
-      <mc:AlternateContent xmlns:mc="http://schemas.openxmlformats.org/markup-compatibility/2006">
-        <mc:Choice xmlns:a14="http://schemas.microsoft.com/office/drawing/2010/main" Requires="a14">
+      <mc:AlternateContent xmlns:mc="http://schemas.openxmlformats.org/markup-compatibility/2006" xmlns:a14="http://schemas.microsoft.com/office/drawing/2010/main">
+        <mc:Choice Requires="a14">
           <p:sp>
             <p:nvSpPr>
               <p:cNvPr id="8" name="TextBox 7">
@@ -8259,7 +8261,7 @@
             </p:txBody>
           </p:sp>
         </mc:Choice>
-        <mc:Fallback>
+        <mc:Fallback xmlns="">
           <p:sp>
             <p:nvSpPr>
               <p:cNvPr id="8" name="TextBox 7">
@@ -8497,7 +8499,7 @@
           <a:p>
             <a:r>
               <a:rPr lang="en-US" dirty="0"/>
-              <a:t>Natural Language Processing</a:t>
+              <a:t>Natural Language Processing (NLP)</a:t>
             </a:r>
           </a:p>
         </p:txBody>
@@ -8520,16 +8522,25 @@
         </p:nvSpPr>
         <p:spPr>
           <a:xfrm>
-            <a:off x="639801" y="1156901"/>
-            <a:ext cx="3221386" cy="1249363"/>
+            <a:off x="639800" y="1156901"/>
+            <a:ext cx="7875550" cy="1319371"/>
           </a:xfrm>
         </p:spPr>
         <p:txBody>
-          <a:bodyPr>
-            <a:normAutofit/>
+          <a:bodyPr numCol="2">
+            <a:normAutofit fontScale="85000" lnSpcReduction="20000"/>
           </a:bodyPr>
           <a:lstStyle/>
           <a:p>
+            <a:pPr marL="0" indent="0">
+              <a:buNone/>
+            </a:pPr>
+            <a:r>
+              <a:rPr lang="en-US" sz="1800" dirty="0"/>
+              <a:t>Tasks:</a:t>
+            </a:r>
+          </a:p>
+          <a:p>
             <a:r>
               <a:rPr lang="en-US" sz="1800" dirty="0"/>
               <a:t>Speech recognition</a:t>
@@ -8538,26 +8549,102 @@
           <a:p>
             <a:r>
               <a:rPr lang="en-US" sz="1800" dirty="0"/>
-              <a:t>Information Retrieval</a:t>
+              <a:t>Text classification</a:t>
             </a:r>
           </a:p>
           <a:p>
             <a:r>
               <a:rPr lang="en-US" sz="1800" dirty="0"/>
-              <a:t>Language Models</a:t>
+              <a:t>Natural-language understanding</a:t>
+            </a:r>
+          </a:p>
+          <a:p>
+            <a:r>
+              <a:rPr lang="en-US" sz="1800" dirty="0"/>
+              <a:t>Natural-language generation.</a:t>
+            </a:r>
+          </a:p>
+          <a:p>
+            <a:pPr marL="0" indent="0">
+              <a:buNone/>
+            </a:pPr>
+            <a:r>
+              <a:rPr lang="en-US" sz="1800" dirty="0"/>
+              <a:t>Techniques:</a:t>
+            </a:r>
+          </a:p>
+          <a:p>
+            <a:r>
+              <a:rPr lang="en-US" sz="1800" dirty="0"/>
+              <a:t>Text embeddings</a:t>
+            </a:r>
+          </a:p>
+          <a:p>
+            <a:r>
+              <a:rPr lang="en-US" sz="1800" dirty="0"/>
+              <a:t>Transformers</a:t>
+            </a:r>
+          </a:p>
+          <a:p>
+            <a:r>
+              <a:rPr lang="en-US" sz="1800" dirty="0"/>
+              <a:t>Large language models (LLMs)</a:t>
+            </a:r>
+          </a:p>
+        </p:txBody>
+      </p:sp>
+      <p:sp>
+        <p:nvSpPr>
+          <p:cNvPr id="5" name="TextBox 4">
+            <a:extLst>
+              <a:ext uri="{FF2B5EF4-FFF2-40B4-BE49-F238E27FC236}">
+                <a16:creationId xmlns:a16="http://schemas.microsoft.com/office/drawing/2014/main" id="{84395F43-0BC8-3D1A-CDAA-2521F5B4F0D1}"/>
+              </a:ext>
+              <a:ext uri="{C183D7F6-B498-43B3-948B-1728B52AA6E4}">
+                <adec:decorative xmlns:adec="http://schemas.microsoft.com/office/drawing/2017/decorative" val="1"/>
+              </a:ext>
+            </a:extLst>
+          </p:cNvPr>
+          <p:cNvSpPr txBox="1"/>
+          <p:nvPr/>
+        </p:nvSpPr>
+        <p:spPr>
+          <a:xfrm>
+            <a:off x="6019800" y="2590800"/>
+            <a:ext cx="2667000" cy="461665"/>
+          </a:xfrm>
+          <a:prstGeom prst="rect">
+            <a:avLst/>
+          </a:prstGeom>
+          <a:noFill/>
+        </p:spPr>
+        <p:txBody>
+          <a:bodyPr wrap="square" rtlCol="0">
+            <a:spAutoFit/>
+          </a:bodyPr>
+          <a:lstStyle/>
+          <a:p>
+            <a:pPr algn="ctr"/>
+            <a:r>
+              <a:rPr lang="en-US" sz="1200" dirty="0"/>
+              <a:t>Decoder-only transformer</a:t>
+            </a:r>
+            <a:br>
+              <a:rPr lang="en-US" sz="1200" dirty="0"/>
+            </a:br>
+            <a:r>
+              <a:rPr lang="en-US" sz="1200" dirty="0"/>
+              <a:t> used by LLMs</a:t>
             </a:r>
           </a:p>
         </p:txBody>
       </p:sp>
       <p:pic>
         <p:nvPicPr>
-          <p:cNvPr id="2050" name="Picture 2">
+          <p:cNvPr id="2052" name="Picture 4" descr="Word Embeddings for PyTorch Text Classification Networks">
             <a:extLst>
               <a:ext uri="{FF2B5EF4-FFF2-40B4-BE49-F238E27FC236}">
-                <a16:creationId xmlns:a16="http://schemas.microsoft.com/office/drawing/2014/main" id="{A8B9A248-A1E1-4E83-B7E9-4ADB84DE7B8C}"/>
-              </a:ext>
-              <a:ext uri="{C183D7F6-B498-43B3-948B-1728B52AA6E4}">
-                <adec:decorative xmlns:adec="http://schemas.microsoft.com/office/drawing/2017/decorative" val="1"/>
+                <a16:creationId xmlns:a16="http://schemas.microsoft.com/office/drawing/2014/main" id="{7C83FC80-3B9D-883E-ECDE-32D8C1E187EB}"/>
               </a:ext>
             </a:extLst>
           </p:cNvPr>
@@ -8566,7 +8653,7 @@
           </p:cNvPicPr>
           <p:nvPr/>
         </p:nvPicPr>
-        <p:blipFill rotWithShape="1">
+        <p:blipFill>
           <a:blip r:embed="rId2" cstate="print">
             <a:extLst>
               <a:ext uri="{28A0092B-C50C-407E-A947-70E740481C1C}">
@@ -8574,13 +8661,62 @@
               </a:ext>
             </a:extLst>
           </a:blip>
-          <a:srcRect l="2041" t="2720" r="979" b="690"/>
-          <a:stretch/>
+          <a:srcRect/>
+          <a:stretch>
+            <a:fillRect/>
+          </a:stretch>
         </p:blipFill>
         <p:spPr bwMode="auto">
           <a:xfrm>
-            <a:off x="1600199" y="1295400"/>
-            <a:ext cx="7239001" cy="5410200"/>
+            <a:off x="304800" y="2476272"/>
+            <a:ext cx="5107589" cy="3813843"/>
+          </a:xfrm>
+          <a:prstGeom prst="rect">
+            <a:avLst/>
+          </a:prstGeom>
+          <a:noFill/>
+          <a:extLst>
+            <a:ext uri="{909E8E84-426E-40DD-AFC4-6F175D3DCCD1}">
+              <a14:hiddenFill xmlns:a14="http://schemas.microsoft.com/office/drawing/2010/main">
+                <a:solidFill>
+                  <a:srgbClr val="FFFFFF"/>
+                </a:solidFill>
+              </a14:hiddenFill>
+            </a:ext>
+          </a:extLst>
+        </p:spPr>
+      </p:pic>
+      <p:pic>
+        <p:nvPicPr>
+          <p:cNvPr id="4" name="Picture 2" descr="A diagram with a decoder-only transformer architecture used by LLMs.&#10;">
+            <a:extLst>
+              <a:ext uri="{FF2B5EF4-FFF2-40B4-BE49-F238E27FC236}">
+                <a16:creationId xmlns:a16="http://schemas.microsoft.com/office/drawing/2014/main" id="{17E88751-D31D-65EC-9D5D-6C2A35FBB5E1}"/>
+              </a:ext>
+            </a:extLst>
+          </p:cNvPr>
+          <p:cNvPicPr>
+            <a:picLocks noChangeAspect="1" noChangeArrowheads="1"/>
+          </p:cNvPicPr>
+          <p:nvPr/>
+        </p:nvPicPr>
+        <p:blipFill>
+          <a:blip r:embed="rId3">
+            <a:extLst>
+              <a:ext uri="{28A0092B-C50C-407E-A947-70E740481C1C}">
+                <a14:useLocalDpi xmlns:a14="http://schemas.microsoft.com/office/drawing/2010/main" val="0"/>
+              </a:ext>
+            </a:extLst>
+          </a:blip>
+          <a:srcRect/>
+          <a:stretch>
+            <a:fillRect/>
+          </a:stretch>
+        </p:blipFill>
+        <p:spPr bwMode="auto">
+          <a:xfrm>
+            <a:off x="5791200" y="2711116"/>
+            <a:ext cx="3487102" cy="4114800"/>
           </a:xfrm>
           <a:prstGeom prst="rect">
             <a:avLst/>
@@ -8599,10 +8735,10 @@
       </p:pic>
       <p:sp>
         <p:nvSpPr>
-          <p:cNvPr id="7" name="TextBox 6">
+          <p:cNvPr id="9" name="TextBox 8">
             <a:extLst>
               <a:ext uri="{FF2B5EF4-FFF2-40B4-BE49-F238E27FC236}">
-                <a16:creationId xmlns:a16="http://schemas.microsoft.com/office/drawing/2014/main" id="{297FB36A-010C-4065-B3AD-0FD5B0D42430}"/>
+                <a16:creationId xmlns:a16="http://schemas.microsoft.com/office/drawing/2014/main" id="{5A9AC65E-E257-3C9D-F698-2F8CC86485CD}"/>
               </a:ext>
               <a:ext uri="{C183D7F6-B498-43B3-948B-1728B52AA6E4}">
                 <adec:decorative xmlns:adec="http://schemas.microsoft.com/office/drawing/2017/decorative" val="1"/>
@@ -8614,8 +8750,8 @@
         </p:nvSpPr>
         <p:spPr>
           <a:xfrm>
-            <a:off x="1981200" y="6567100"/>
-            <a:ext cx="9829800" cy="276999"/>
+            <a:off x="390714" y="6360239"/>
+            <a:ext cx="5039906" cy="307777"/>
           </a:xfrm>
           <a:prstGeom prst="rect">
             <a:avLst/>
@@ -8623,22 +8759,34 @@
           <a:noFill/>
         </p:spPr>
         <p:txBody>
-          <a:bodyPr wrap="square">
+          <a:bodyPr wrap="none" rtlCol="0">
             <a:spAutoFit/>
           </a:bodyPr>
           <a:lstStyle/>
           <a:p>
             <a:r>
-              <a:rPr lang="en-US" sz="1200"/>
-              <a:t>Source:  </a:t>
-            </a:r>
-            <a:r>
-              <a:rPr lang="en-US" sz="1200">
-                <a:hlinkClick r:id="rId3"/>
+              <a:rPr lang="en-US" sz="1400" dirty="0"/>
+              <a:t>Source: </a:t>
+            </a:r>
+            <a:r>
+              <a:rPr lang="en-US" sz="1400" dirty="0">
+                <a:hlinkClick r:id="rId4"/>
               </a:rPr>
-              <a:t>Leveraging Deep Learning for Multilingual Sentiment Analysis - AYLIEN News API</a:t>
-            </a:r>
-            <a:endParaRPr lang="en-US" sz="1200" dirty="0"/>
+              <a:t>Word Embeddings for </a:t>
+            </a:r>
+            <a:r>
+              <a:rPr lang="en-US" sz="1400" dirty="0" err="1">
+                <a:hlinkClick r:id="rId4"/>
+              </a:rPr>
+              <a:t>PyTorch</a:t>
+            </a:r>
+            <a:r>
+              <a:rPr lang="en-US" sz="1400" dirty="0">
+                <a:hlinkClick r:id="rId4"/>
+              </a:rPr>
+              <a:t> Text Classification Networks</a:t>
+            </a:r>
+            <a:endParaRPr lang="en-US" sz="1400" dirty="0"/>
           </a:p>
         </p:txBody>
       </p:sp>
@@ -8698,8 +8846,8 @@
         </p:nvSpPr>
         <p:spPr>
           <a:xfrm>
-            <a:off x="360758" y="3752849"/>
-            <a:ext cx="8554642" cy="2452687"/>
+            <a:off x="360759" y="3752849"/>
+            <a:ext cx="2468166" cy="2452687"/>
           </a:xfrm>
         </p:spPr>
         <p:txBody>
@@ -8708,42 +8856,22 @@
           </a:bodyPr>
           <a:lstStyle/>
           <a:p>
-            <a:pPr algn="ctr"/>
-            <a:r>
-              <a:rPr lang="en-US" sz="3100" dirty="0"/>
+            <a:r>
+              <a:rPr lang="en-US" sz="3600" b="1" dirty="0"/>
               <a:t>Computer Vision</a:t>
             </a:r>
-            <a:br>
-              <a:rPr lang="en-US" sz="3100" dirty="0"/>
-            </a:br>
-            <a:r>
-              <a:rPr lang="en-US" sz="3100" dirty="0"/>
-              <a:t>Image Processing &amp; </a:t>
-            </a:r>
-            <a:r>
-              <a:rPr lang="en-US" sz="3200" dirty="0"/>
-              <a:t>Object Recognition</a:t>
-            </a:r>
-            <a:br>
-              <a:rPr lang="en-US" sz="3200" dirty="0"/>
-            </a:br>
-            <a:br>
-              <a:rPr lang="en-US" sz="3200" dirty="0"/>
-            </a:br>
-            <a:r>
-              <a:rPr lang="en-US" sz="2400" dirty="0"/>
-              <a:t>Uses Deep Convolutional Neural Networks </a:t>
-            </a:r>
-            <a:endParaRPr lang="en-US" sz="3100" dirty="0"/>
           </a:p>
         </p:txBody>
       </p:sp>
       <p:pic>
         <p:nvPicPr>
-          <p:cNvPr id="3074" name="Picture 2" descr="See the source image">
+          <p:cNvPr id="3074" name="Picture 2">
             <a:extLst>
               <a:ext uri="{FF2B5EF4-FFF2-40B4-BE49-F238E27FC236}">
                 <a16:creationId xmlns:a16="http://schemas.microsoft.com/office/drawing/2014/main" id="{0AFD5689-018C-4837-857F-57A269716A39}"/>
+              </a:ext>
+              <a:ext uri="{C183D7F6-B498-43B3-948B-1728B52AA6E4}">
+                <adec:decorative xmlns:adec="http://schemas.microsoft.com/office/drawing/2017/decorative" val="1"/>
               </a:ext>
             </a:extLst>
           </p:cNvPr>
@@ -8812,6 +8940,133 @@
           </a:extLst>
         </p:spPr>
       </p:pic>
+      <p:sp>
+        <p:nvSpPr>
+          <p:cNvPr id="3" name="Content Placeholder 2">
+            <a:extLst>
+              <a:ext uri="{FF2B5EF4-FFF2-40B4-BE49-F238E27FC236}">
+                <a16:creationId xmlns:a16="http://schemas.microsoft.com/office/drawing/2014/main" id="{8779F921-2525-9E49-8FE9-A28CF0FD5AD2}"/>
+              </a:ext>
+            </a:extLst>
+          </p:cNvPr>
+          <p:cNvSpPr>
+            <a:spLocks noGrp="1"/>
+          </p:cNvSpPr>
+          <p:nvPr>
+            <p:ph idx="1"/>
+          </p:nvPr>
+        </p:nvSpPr>
+        <p:spPr>
+          <a:xfrm>
+            <a:off x="3167986" y="3752850"/>
+            <a:ext cx="5614060" cy="2647950"/>
+          </a:xfrm>
+        </p:spPr>
+        <p:txBody>
+          <a:bodyPr anchor="ctr">
+            <a:normAutofit/>
+          </a:bodyPr>
+          <a:lstStyle/>
+          <a:p>
+            <a:r>
+              <a:rPr lang="en-US" sz="1600" dirty="0"/>
+              <a:t>Object detection</a:t>
+            </a:r>
+          </a:p>
+          <a:p>
+            <a:r>
+              <a:rPr lang="en-US" sz="1600" dirty="0"/>
+              <a:t>Event detection</a:t>
+            </a:r>
+          </a:p>
+          <a:p>
+            <a:r>
+              <a:rPr lang="en-US" sz="1600" dirty="0"/>
+              <a:t>Activity recognition</a:t>
+            </a:r>
+          </a:p>
+          <a:p>
+            <a:r>
+              <a:rPr lang="en-US" sz="1600" dirty="0"/>
+              <a:t>Video tracking</a:t>
+            </a:r>
+          </a:p>
+          <a:p>
+            <a:r>
+              <a:rPr lang="en-US" sz="1600" dirty="0"/>
+              <a:t>Object recognition</a:t>
+            </a:r>
+          </a:p>
+          <a:p>
+            <a:r>
+              <a:rPr lang="en-US" sz="1600" dirty="0"/>
+              <a:t>3D pose estimation</a:t>
+            </a:r>
+          </a:p>
+          <a:p>
+            <a:endParaRPr lang="en-US" sz="1600" dirty="0"/>
+          </a:p>
+          <a:p>
+            <a:r>
+              <a:rPr lang="en-US" sz="1600" dirty="0"/>
+              <a:t>Uses Deep Convolutional Neural Networks</a:t>
+            </a:r>
+          </a:p>
+        </p:txBody>
+      </p:sp>
+      <p:sp>
+        <p:nvSpPr>
+          <p:cNvPr id="4" name="TextBox 3">
+            <a:extLst>
+              <a:ext uri="{FF2B5EF4-FFF2-40B4-BE49-F238E27FC236}">
+                <a16:creationId xmlns:a16="http://schemas.microsoft.com/office/drawing/2014/main" id="{CABD32DC-2FFD-ADAE-81E0-1D21C226AC2C}"/>
+              </a:ext>
+              <a:ext uri="{C183D7F6-B498-43B3-948B-1728B52AA6E4}">
+                <adec:decorative xmlns:adec="http://schemas.microsoft.com/office/drawing/2017/decorative" val="1"/>
+              </a:ext>
+            </a:extLst>
+          </p:cNvPr>
+          <p:cNvSpPr txBox="1"/>
+          <p:nvPr/>
+        </p:nvSpPr>
+        <p:spPr>
+          <a:xfrm>
+            <a:off x="7791446" y="272534"/>
+            <a:ext cx="990600" cy="369332"/>
+          </a:xfrm>
+          <a:prstGeom prst="rect">
+            <a:avLst/>
+          </a:prstGeom>
+        </p:spPr>
+        <p:style>
+          <a:lnRef idx="2">
+            <a:schemeClr val="accent2">
+              <a:shade val="15000"/>
+            </a:schemeClr>
+          </a:lnRef>
+          <a:fillRef idx="1">
+            <a:schemeClr val="accent2"/>
+          </a:fillRef>
+          <a:effectRef idx="0">
+            <a:schemeClr val="accent2"/>
+          </a:effectRef>
+          <a:fontRef idx="minor">
+            <a:schemeClr val="lt1"/>
+          </a:fontRef>
+        </p:style>
+        <p:txBody>
+          <a:bodyPr wrap="square" rtlCol="0">
+            <a:spAutoFit/>
+          </a:bodyPr>
+          <a:lstStyle/>
+          <a:p>
+            <a:r>
+              <a:rPr lang="en-US" dirty="0"/>
+              <a:t>Percepts</a:t>
+            </a:r>
+          </a:p>
+        </p:txBody>
+      </p:sp>
     </p:spTree>
     <p:extLst>
       <p:ext uri="{BB962C8B-B14F-4D97-AF65-F5344CB8AC3E}">
@@ -8822,104 +9077,20 @@
   <p:clrMapOvr>
     <a:masterClrMapping/>
   </p:clrMapOvr>
-  <p:timing>
-    <p:tnLst>
-      <p:par>
-        <p:cTn id="1" dur="indefinite" restart="never" nodeType="tmRoot">
-          <p:childTnLst>
-            <p:seq concurrent="1" nextAc="seek">
-              <p:cTn id="2" dur="indefinite" nodeType="mainSeq">
-                <p:childTnLst>
-                  <p:par>
-                    <p:cTn id="3" fill="hold">
-                      <p:stCondLst>
-                        <p:cond delay="indefinite"/>
-                        <p:cond evt="onBegin" delay="0">
-                          <p:tn val="2"/>
-                        </p:cond>
-                      </p:stCondLst>
-                      <p:childTnLst>
-                        <p:par>
-                          <p:cTn id="4" fill="hold">
-                            <p:stCondLst>
-                              <p:cond delay="0"/>
-                            </p:stCondLst>
-                            <p:childTnLst>
-                              <p:par>
-                                <p:cTn id="5" presetID="10" presetClass="entr" presetSubtype="0" fill="hold" grpId="0" nodeType="withEffect">
-                                  <p:stCondLst>
-                                    <p:cond delay="1000"/>
-                                  </p:stCondLst>
-                                  <p:iterate type="lt">
-                                    <p:tmPct val="10000"/>
-                                  </p:iterate>
-                                  <p:childTnLst>
-                                    <p:set>
-                                      <p:cBhvr>
-                                        <p:cTn id="6" dur="1" fill="hold">
-                                          <p:stCondLst>
-                                            <p:cond delay="0"/>
-                                          </p:stCondLst>
-                                        </p:cTn>
-                                        <p:tgtEl>
-                                          <p:spTgt spid="2"/>
-                                        </p:tgtEl>
-                                        <p:attrNameLst>
-                                          <p:attrName>style.visibility</p:attrName>
-                                        </p:attrNameLst>
-                                      </p:cBhvr>
-                                      <p:to>
-                                        <p:strVal val="visible"/>
-                                      </p:to>
-                                    </p:set>
-                                    <p:animEffect transition="in" filter="fade">
-                                      <p:cBhvr>
-                                        <p:cTn id="7" dur="400"/>
-                                        <p:tgtEl>
-                                          <p:spTgt spid="2"/>
-                                        </p:tgtEl>
-                                      </p:cBhvr>
-                                    </p:animEffect>
-                                  </p:childTnLst>
-                                </p:cTn>
-                              </p:par>
-                            </p:childTnLst>
-                          </p:cTn>
-                        </p:par>
-                      </p:childTnLst>
-                    </p:cTn>
-                  </p:par>
-                </p:childTnLst>
-              </p:cTn>
-              <p:prevCondLst>
-                <p:cond evt="onPrev" delay="0">
-                  <p:tgtEl>
-                    <p:sldTgt/>
-                  </p:tgtEl>
-                </p:cond>
-              </p:prevCondLst>
-              <p:nextCondLst>
-                <p:cond evt="onNext" delay="0">
-                  <p:tgtEl>
-                    <p:sldTgt/>
-                  </p:tgtEl>
-                </p:cond>
-              </p:nextCondLst>
-            </p:seq>
-          </p:childTnLst>
-        </p:cTn>
-      </p:par>
-    </p:tnLst>
-    <p:bldLst>
-      <p:bldP spid="2" grpId="0"/>
-    </p:bldLst>
-  </p:timing>
 </p:sld>
 </file>
 
 <file path=ppt/slides/slide5.xml><?xml version="1.0" encoding="utf-8"?>
 <p:sld xmlns:a="http://schemas.openxmlformats.org/drawingml/2006/main" xmlns:r="http://schemas.openxmlformats.org/officeDocument/2006/relationships" xmlns:p="http://schemas.openxmlformats.org/presentationml/2006/main">
   <p:cSld>
+    <p:bg>
+      <p:bgPr>
+        <a:solidFill>
+          <a:schemeClr val="bg1"/>
+        </a:solidFill>
+        <a:effectLst/>
+      </p:bgPr>
+    </p:bg>
     <p:spTree>
       <p:nvGrpSpPr>
         <p:cNvPr id="1" name=""/>
@@ -8934,6 +9105,66 @@
           <a:chExt cx="0" cy="0"/>
         </a:xfrm>
       </p:grpSpPr>
+      <p:sp useBgFill="1">
+        <p:nvSpPr>
+          <p:cNvPr id="4103" name="Rectangle 4102">
+            <a:extLst>
+              <a:ext uri="{FF2B5EF4-FFF2-40B4-BE49-F238E27FC236}">
+                <a16:creationId xmlns:a16="http://schemas.microsoft.com/office/drawing/2014/main" id="{5A59F003-E00A-43F9-91DC-CC54E3B87466}"/>
+              </a:ext>
+              <a:ext uri="{C183D7F6-B498-43B3-948B-1728B52AA6E4}">
+                <adec:decorative xmlns:adec="http://schemas.microsoft.com/office/drawing/2017/decorative" val="1"/>
+              </a:ext>
+            </a:extLst>
+          </p:cNvPr>
+          <p:cNvSpPr>
+            <a:spLocks noGrp="1" noRot="1" noChangeAspect="1" noMove="1" noResize="1" noEditPoints="1" noAdjustHandles="1" noChangeArrowheads="1" noChangeShapeType="1" noTextEdit="1"/>
+          </p:cNvSpPr>
+          <p:nvPr>
+            <p:extLst>
+              <p:ext uri="{386F3935-93C4-4BCD-93E2-E3B085C9AB24}">
+                <p16:designElem xmlns:p16="http://schemas.microsoft.com/office/powerpoint/2015/main" val="1"/>
+              </p:ext>
+            </p:extLst>
+          </p:nvPr>
+        </p:nvSpPr>
+        <p:spPr>
+          <a:xfrm>
+            <a:off x="0" y="0"/>
+            <a:ext cx="9144000" cy="6858000"/>
+          </a:xfrm>
+          <a:prstGeom prst="rect">
+            <a:avLst/>
+          </a:prstGeom>
+          <a:ln>
+            <a:noFill/>
+          </a:ln>
+        </p:spPr>
+        <p:style>
+          <a:lnRef idx="2">
+            <a:schemeClr val="accent1">
+              <a:shade val="50000"/>
+            </a:schemeClr>
+          </a:lnRef>
+          <a:fillRef idx="1">
+            <a:schemeClr val="accent1"/>
+          </a:fillRef>
+          <a:effectRef idx="0">
+            <a:schemeClr val="accent1"/>
+          </a:effectRef>
+          <a:fontRef idx="minor">
+            <a:schemeClr val="lt1"/>
+          </a:fontRef>
+        </p:style>
+        <p:txBody>
+          <a:bodyPr rtlCol="0" anchor="ctr"/>
+          <a:lstStyle/>
+          <a:p>
+            <a:pPr algn="ctr"/>
+            <a:endParaRPr lang="en-US"/>
+          </a:p>
+        </p:txBody>
+      </p:sp>
       <p:pic>
         <p:nvPicPr>
           <p:cNvPr id="4098" name="Picture 2">
@@ -8959,15 +9190,843 @@
               </a:ext>
             </a:extLst>
           </a:blip>
-          <a:srcRect/>
-          <a:stretch>
-            <a:fillRect/>
-          </a:stretch>
+          <a:srcRect l="4399" t="9091" r="4692"/>
+          <a:stretch/>
         </p:blipFill>
         <p:spPr bwMode="auto">
           <a:xfrm>
+            <a:off x="20" y="10"/>
+            <a:ext cx="9143980" cy="6857990"/>
+          </a:xfrm>
+          <a:prstGeom prst="rect">
+            <a:avLst/>
+          </a:prstGeom>
+          <a:noFill/>
+          <a:extLst>
+            <a:ext uri="{909E8E84-426E-40DD-AFC4-6F175D3DCCD1}">
+              <a14:hiddenFill xmlns:a14="http://schemas.microsoft.com/office/drawing/2010/main">
+                <a:solidFill>
+                  <a:srgbClr val="FFFFFF"/>
+                </a:solidFill>
+              </a14:hiddenFill>
+            </a:ext>
+          </a:extLst>
+        </p:spPr>
+      </p:pic>
+      <p:sp>
+        <p:nvSpPr>
+          <p:cNvPr id="4105" name="Rectangle 4104">
+            <a:extLst>
+              <a:ext uri="{FF2B5EF4-FFF2-40B4-BE49-F238E27FC236}">
+                <a16:creationId xmlns:a16="http://schemas.microsoft.com/office/drawing/2014/main" id="{D74A4382-E3AD-430A-9A1F-DFA3E0E77A7D}"/>
+              </a:ext>
+              <a:ext uri="{C183D7F6-B498-43B3-948B-1728B52AA6E4}">
+                <adec:decorative xmlns:adec="http://schemas.microsoft.com/office/drawing/2017/decorative" val="1"/>
+              </a:ext>
+            </a:extLst>
+          </p:cNvPr>
+          <p:cNvSpPr>
+            <a:spLocks noGrp="1" noRot="1" noChangeAspect="1" noMove="1" noResize="1" noEditPoints="1" noAdjustHandles="1" noChangeArrowheads="1" noChangeShapeType="1" noTextEdit="1"/>
+          </p:cNvSpPr>
+          <p:nvPr>
+            <p:extLst>
+              <p:ext uri="{386F3935-93C4-4BCD-93E2-E3B085C9AB24}">
+                <p16:designElem xmlns:p16="http://schemas.microsoft.com/office/powerpoint/2015/main" val="1"/>
+              </p:ext>
+            </p:extLst>
+          </p:nvPr>
+        </p:nvSpPr>
+        <p:spPr>
+          <a:xfrm rot="16200000">
+            <a:off x="2275865" y="-511"/>
+            <a:ext cx="4592270" cy="9144001"/>
+          </a:xfrm>
+          <a:prstGeom prst="rect">
+            <a:avLst/>
+          </a:prstGeom>
+          <a:gradFill>
+            <a:gsLst>
+              <a:gs pos="35000">
+                <a:schemeClr val="tx1">
+                  <a:alpha val="46000"/>
+                </a:schemeClr>
+              </a:gs>
+              <a:gs pos="21000">
+                <a:schemeClr val="tx1">
+                  <a:alpha val="30000"/>
+                </a:schemeClr>
+              </a:gs>
+              <a:gs pos="0">
+                <a:schemeClr val="tx1">
+                  <a:alpha val="0"/>
+                </a:schemeClr>
+              </a:gs>
+              <a:gs pos="100000">
+                <a:schemeClr val="tx1">
+                  <a:alpha val="90000"/>
+                </a:schemeClr>
+              </a:gs>
+            </a:gsLst>
+            <a:lin ang="10800000" scaled="0"/>
+          </a:gradFill>
+          <a:ln>
+            <a:noFill/>
+          </a:ln>
+        </p:spPr>
+        <p:style>
+          <a:lnRef idx="2">
+            <a:schemeClr val="accent1">
+              <a:shade val="50000"/>
+            </a:schemeClr>
+          </a:lnRef>
+          <a:fillRef idx="1">
+            <a:schemeClr val="accent1"/>
+          </a:fillRef>
+          <a:effectRef idx="0">
+            <a:schemeClr val="accent1"/>
+          </a:effectRef>
+          <a:fontRef idx="minor">
+            <a:schemeClr val="lt1"/>
+          </a:fontRef>
+        </p:style>
+        <p:txBody>
+          <a:bodyPr rtlCol="0" anchor="ctr"/>
+          <a:lstStyle/>
+          <a:p>
+            <a:pPr algn="ctr"/>
+            <a:endParaRPr lang="en-US" dirty="0"/>
+          </a:p>
+        </p:txBody>
+      </p:sp>
+      <p:sp>
+        <p:nvSpPr>
+          <p:cNvPr id="2" name="Title 1">
+            <a:extLst>
+              <a:ext uri="{FF2B5EF4-FFF2-40B4-BE49-F238E27FC236}">
+                <a16:creationId xmlns:a16="http://schemas.microsoft.com/office/drawing/2014/main" id="{C44D7C84-B190-4132-AEAB-D61B1E6C4E9B}"/>
+              </a:ext>
+            </a:extLst>
+          </p:cNvPr>
+          <p:cNvSpPr>
+            <a:spLocks noGrp="1"/>
+          </p:cNvSpPr>
+          <p:nvPr>
+            <p:ph type="title"/>
+          </p:nvPr>
+        </p:nvSpPr>
+        <p:spPr>
+          <a:xfrm>
+            <a:off x="303414" y="3091928"/>
+            <a:ext cx="6808922" cy="2387600"/>
+          </a:xfrm>
+        </p:spPr>
+        <p:txBody>
+          <a:bodyPr vert="horz" lIns="91440" tIns="45720" rIns="91440" bIns="45720" rtlCol="0" anchor="b">
+            <a:normAutofit/>
+          </a:bodyPr>
+          <a:lstStyle/>
+          <a:p>
+            <a:pPr defTabSz="914400"/>
+            <a:r>
+              <a:rPr lang="en-US" sz="5700" dirty="0">
+                <a:solidFill>
+                  <a:schemeClr val="bg1"/>
+                </a:solidFill>
+              </a:rPr>
+              <a:t>  Robotics</a:t>
+            </a:r>
+          </a:p>
+        </p:txBody>
+      </p:sp>
+      <p:sp>
+        <p:nvSpPr>
+          <p:cNvPr id="4107" name="Rectangle: Rounded Corners 4106">
+            <a:extLst>
+              <a:ext uri="{FF2B5EF4-FFF2-40B4-BE49-F238E27FC236}">
+                <a16:creationId xmlns:a16="http://schemas.microsoft.com/office/drawing/2014/main" id="{79F40191-0F44-4FD1-82CC-ACB507C14BE6}"/>
+              </a:ext>
+              <a:ext uri="{C183D7F6-B498-43B3-948B-1728B52AA6E4}">
+                <adec:decorative xmlns:adec="http://schemas.microsoft.com/office/drawing/2017/decorative" val="1"/>
+              </a:ext>
+            </a:extLst>
+          </p:cNvPr>
+          <p:cNvSpPr>
+            <a:spLocks noGrp="1" noRot="1" noChangeAspect="1" noMove="1" noResize="1" noEditPoints="1" noAdjustHandles="1" noChangeArrowheads="1" noChangeShapeType="1" noTextEdit="1"/>
+          </p:cNvSpPr>
+          <p:nvPr>
+            <p:extLst>
+              <p:ext uri="{386F3935-93C4-4BCD-93E2-E3B085C9AB24}">
+                <p16:designElem xmlns:p16="http://schemas.microsoft.com/office/powerpoint/2015/main" val="1"/>
+              </p:ext>
+            </p:extLst>
+          </p:nvPr>
+        </p:nvSpPr>
+        <p:spPr>
+          <a:xfrm>
+            <a:off x="0" y="5575039"/>
+            <a:ext cx="7339422" cy="685800"/>
+          </a:xfrm>
+          <a:prstGeom prst="roundRect">
+            <a:avLst>
+              <a:gd name="adj" fmla="val 0"/>
+            </a:avLst>
+          </a:prstGeom>
+          <a:solidFill>
+            <a:schemeClr val="accent2"/>
+          </a:solidFill>
+          <a:ln>
+            <a:noFill/>
+          </a:ln>
+        </p:spPr>
+        <p:style>
+          <a:lnRef idx="2">
+            <a:schemeClr val="accent1">
+              <a:shade val="50000"/>
+            </a:schemeClr>
+          </a:lnRef>
+          <a:fillRef idx="1">
+            <a:schemeClr val="accent1"/>
+          </a:fillRef>
+          <a:effectRef idx="0">
+            <a:schemeClr val="accent1"/>
+          </a:effectRef>
+          <a:fontRef idx="minor">
+            <a:schemeClr val="lt1"/>
+          </a:fontRef>
+        </p:style>
+        <p:txBody>
+          <a:bodyPr rtlCol="0" anchor="ctr"/>
+          <a:lstStyle/>
+          <a:p>
+            <a:pPr algn="ctr"/>
+            <a:endParaRPr lang="en-US"/>
+          </a:p>
+        </p:txBody>
+      </p:sp>
+      <p:sp>
+        <p:nvSpPr>
+          <p:cNvPr id="3" name="Content Placeholder 2">
+            <a:extLst>
+              <a:ext uri="{FF2B5EF4-FFF2-40B4-BE49-F238E27FC236}">
+                <a16:creationId xmlns:a16="http://schemas.microsoft.com/office/drawing/2014/main" id="{18A0DFC2-A097-4722-ACFA-ADD8C82A0CA2}"/>
+              </a:ext>
+            </a:extLst>
+          </p:cNvPr>
+          <p:cNvSpPr>
+            <a:spLocks noGrp="1"/>
+          </p:cNvSpPr>
+          <p:nvPr>
+            <p:ph idx="1"/>
+          </p:nvPr>
+        </p:nvSpPr>
+        <p:spPr>
+          <a:xfrm>
+            <a:off x="303414" y="5624945"/>
+            <a:ext cx="6808922" cy="592975"/>
+          </a:xfrm>
+        </p:spPr>
+        <p:txBody>
+          <a:bodyPr vert="horz" lIns="91440" tIns="45720" rIns="91440" bIns="45720" rtlCol="0" anchor="ctr">
+            <a:normAutofit/>
+          </a:bodyPr>
+          <a:lstStyle/>
+          <a:p>
+            <a:pPr marL="0" indent="0" defTabSz="914400">
+              <a:spcBef>
+                <a:spcPts val="1000"/>
+              </a:spcBef>
+              <a:buNone/>
+            </a:pPr>
+            <a:r>
+              <a:rPr lang="en-US" sz="2000">
+                <a:solidFill>
+                  <a:schemeClr val="bg1"/>
+                </a:solidFill>
+              </a:rPr>
+              <a:t>Hardware, sensors, control theory (feedback-based controllers)</a:t>
+            </a:r>
+          </a:p>
+        </p:txBody>
+      </p:sp>
+      <p:sp>
+        <p:nvSpPr>
+          <p:cNvPr id="4" name="TextBox 3">
+            <a:extLst>
+              <a:ext uri="{FF2B5EF4-FFF2-40B4-BE49-F238E27FC236}">
+                <a16:creationId xmlns:a16="http://schemas.microsoft.com/office/drawing/2014/main" id="{BBEE0C49-97C9-68C8-7098-C033742453EE}"/>
+              </a:ext>
+            </a:extLst>
+          </p:cNvPr>
+          <p:cNvSpPr txBox="1"/>
+          <p:nvPr/>
+        </p:nvSpPr>
+        <p:spPr>
+          <a:xfrm>
+            <a:off x="6781800" y="412495"/>
+            <a:ext cx="1981200" cy="369332"/>
+          </a:xfrm>
+          <a:prstGeom prst="rect">
+            <a:avLst/>
+          </a:prstGeom>
+        </p:spPr>
+        <p:style>
+          <a:lnRef idx="2">
+            <a:schemeClr val="accent2">
+              <a:shade val="15000"/>
+            </a:schemeClr>
+          </a:lnRef>
+          <a:fillRef idx="1">
+            <a:schemeClr val="accent2"/>
+          </a:fillRef>
+          <a:effectRef idx="0">
+            <a:schemeClr val="accent2"/>
+          </a:effectRef>
+          <a:fontRef idx="minor">
+            <a:schemeClr val="lt1"/>
+          </a:fontRef>
+        </p:style>
+        <p:txBody>
+          <a:bodyPr wrap="square" rtlCol="0">
+            <a:spAutoFit/>
+          </a:bodyPr>
+          <a:lstStyle/>
+          <a:p>
+            <a:r>
+              <a:rPr lang="en-US" dirty="0"/>
+              <a:t>Percepts &amp; Actions</a:t>
+            </a:r>
+          </a:p>
+        </p:txBody>
+      </p:sp>
+    </p:spTree>
+    <p:extLst>
+      <p:ext uri="{BB962C8B-B14F-4D97-AF65-F5344CB8AC3E}">
+        <p14:creationId xmlns:p14="http://schemas.microsoft.com/office/powerpoint/2010/main" val="4189258210"/>
+      </p:ext>
+    </p:extLst>
+  </p:cSld>
+  <p:clrMapOvr>
+    <a:masterClrMapping/>
+  </p:clrMapOvr>
+</p:sld>
+</file>
+
+<file path=ppt/slides/slide6.xml><?xml version="1.0" encoding="utf-8"?>
+<p:sld xmlns:a="http://schemas.openxmlformats.org/drawingml/2006/main" xmlns:r="http://schemas.openxmlformats.org/officeDocument/2006/relationships" xmlns:p="http://schemas.openxmlformats.org/presentationml/2006/main">
+  <p:cSld>
+    <p:bg>
+      <p:bgPr>
+        <a:solidFill>
+          <a:schemeClr val="bg1"/>
+        </a:solidFill>
+        <a:effectLst/>
+      </p:bgPr>
+    </p:bg>
+    <p:spTree>
+      <p:nvGrpSpPr>
+        <p:cNvPr id="1" name=""/>
+        <p:cNvGrpSpPr/>
+        <p:nvPr/>
+      </p:nvGrpSpPr>
+      <p:grpSpPr>
+        <a:xfrm>
+          <a:off x="0" y="0"/>
+          <a:ext cx="0" cy="0"/>
+          <a:chOff x="0" y="0"/>
+          <a:chExt cx="0" cy="0"/>
+        </a:xfrm>
+      </p:grpSpPr>
+      <p:sp useBgFill="1">
+        <p:nvSpPr>
+          <p:cNvPr id="1028" name="Rectangle 1027">
+            <a:extLst>
+              <a:ext uri="{FF2B5EF4-FFF2-40B4-BE49-F238E27FC236}">
+                <a16:creationId xmlns:a16="http://schemas.microsoft.com/office/drawing/2014/main" id="{5A59F003-E00A-43F9-91DC-CC54E3B87466}"/>
+              </a:ext>
+              <a:ext uri="{C183D7F6-B498-43B3-948B-1728B52AA6E4}">
+                <adec:decorative xmlns:adec="http://schemas.microsoft.com/office/drawing/2017/decorative" val="1"/>
+              </a:ext>
+            </a:extLst>
+          </p:cNvPr>
+          <p:cNvSpPr>
+            <a:spLocks noGrp="1" noRot="1" noChangeAspect="1" noMove="1" noResize="1" noEditPoints="1" noAdjustHandles="1" noChangeArrowheads="1" noChangeShapeType="1" noTextEdit="1"/>
+          </p:cNvSpPr>
+          <p:nvPr>
+            <p:extLst>
+              <p:ext uri="{386F3935-93C4-4BCD-93E2-E3B085C9AB24}">
+                <p16:designElem xmlns:p16="http://schemas.microsoft.com/office/powerpoint/2015/main" val="1"/>
+              </p:ext>
+            </p:extLst>
+          </p:nvPr>
+        </p:nvSpPr>
+        <p:spPr>
+          <a:xfrm>
             <a:off x="0" y="0"/>
             <a:ext cx="9144000" cy="6858000"/>
+          </a:xfrm>
+          <a:prstGeom prst="rect">
+            <a:avLst/>
+          </a:prstGeom>
+          <a:ln>
+            <a:noFill/>
+          </a:ln>
+        </p:spPr>
+        <p:style>
+          <a:lnRef idx="2">
+            <a:schemeClr val="accent1">
+              <a:shade val="50000"/>
+            </a:schemeClr>
+          </a:lnRef>
+          <a:fillRef idx="1">
+            <a:schemeClr val="accent1"/>
+          </a:fillRef>
+          <a:effectRef idx="0">
+            <a:schemeClr val="accent1"/>
+          </a:effectRef>
+          <a:fontRef idx="minor">
+            <a:schemeClr val="lt1"/>
+          </a:fontRef>
+        </p:style>
+        <p:txBody>
+          <a:bodyPr rtlCol="0" anchor="ctr"/>
+          <a:lstStyle/>
+          <a:p>
+            <a:pPr algn="ctr"/>
+            <a:endParaRPr lang="en-US"/>
+          </a:p>
+        </p:txBody>
+      </p:sp>
+      <p:pic>
+        <p:nvPicPr>
+          <p:cNvPr id="1026" name="Picture 2" descr="1. Agents in Action (RoboCup 2002).">
+            <a:extLst>
+              <a:ext uri="{FF2B5EF4-FFF2-40B4-BE49-F238E27FC236}">
+                <a16:creationId xmlns:a16="http://schemas.microsoft.com/office/drawing/2014/main" id="{080190DF-2122-D125-BA98-D4D0431E7EA8}"/>
+              </a:ext>
+            </a:extLst>
+          </p:cNvPr>
+          <p:cNvPicPr>
+            <a:picLocks noChangeAspect="1" noChangeArrowheads="1"/>
+          </p:cNvPicPr>
+          <p:nvPr/>
+        </p:nvPicPr>
+        <p:blipFill>
+          <a:blip r:embed="rId2">
+            <a:extLst>
+              <a:ext uri="{28A0092B-C50C-407E-A947-70E740481C1C}">
+                <a14:useLocalDpi xmlns:a14="http://schemas.microsoft.com/office/drawing/2010/main" val="0"/>
+              </a:ext>
+            </a:extLst>
+          </a:blip>
+          <a:srcRect t="9091" r="9090" b="-1"/>
+          <a:stretch/>
+        </p:blipFill>
+        <p:spPr bwMode="auto">
+          <a:xfrm>
+            <a:off x="20" y="10"/>
+            <a:ext cx="9143980" cy="6857990"/>
+          </a:xfrm>
+          <a:prstGeom prst="rect">
+            <a:avLst/>
+          </a:prstGeom>
+          <a:noFill/>
+          <a:extLst>
+            <a:ext uri="{909E8E84-426E-40DD-AFC4-6F175D3DCCD1}">
+              <a14:hiddenFill xmlns:a14="http://schemas.microsoft.com/office/drawing/2010/main">
+                <a:solidFill>
+                  <a:srgbClr val="FFFFFF"/>
+                </a:solidFill>
+              </a14:hiddenFill>
+            </a:ext>
+          </a:extLst>
+        </p:spPr>
+      </p:pic>
+      <p:sp>
+        <p:nvSpPr>
+          <p:cNvPr id="1029" name="Rectangle 1028">
+            <a:extLst>
+              <a:ext uri="{FF2B5EF4-FFF2-40B4-BE49-F238E27FC236}">
+                <a16:creationId xmlns:a16="http://schemas.microsoft.com/office/drawing/2014/main" id="{D74A4382-E3AD-430A-9A1F-DFA3E0E77A7D}"/>
+              </a:ext>
+              <a:ext uri="{C183D7F6-B498-43B3-948B-1728B52AA6E4}">
+                <adec:decorative xmlns:adec="http://schemas.microsoft.com/office/drawing/2017/decorative" val="1"/>
+              </a:ext>
+            </a:extLst>
+          </p:cNvPr>
+          <p:cNvSpPr>
+            <a:spLocks noGrp="1" noRot="1" noChangeAspect="1" noMove="1" noResize="1" noEditPoints="1" noAdjustHandles="1" noChangeArrowheads="1" noChangeShapeType="1" noTextEdit="1"/>
+          </p:cNvSpPr>
+          <p:nvPr>
+            <p:extLst>
+              <p:ext uri="{386F3935-93C4-4BCD-93E2-E3B085C9AB24}">
+                <p16:designElem xmlns:p16="http://schemas.microsoft.com/office/powerpoint/2015/main" val="1"/>
+              </p:ext>
+            </p:extLst>
+          </p:nvPr>
+        </p:nvSpPr>
+        <p:spPr>
+          <a:xfrm rot="16200000">
+            <a:off x="2275865" y="-511"/>
+            <a:ext cx="4592270" cy="9144001"/>
+          </a:xfrm>
+          <a:prstGeom prst="rect">
+            <a:avLst/>
+          </a:prstGeom>
+          <a:gradFill>
+            <a:gsLst>
+              <a:gs pos="35000">
+                <a:schemeClr val="tx1">
+                  <a:alpha val="46000"/>
+                </a:schemeClr>
+              </a:gs>
+              <a:gs pos="21000">
+                <a:schemeClr val="tx1">
+                  <a:alpha val="30000"/>
+                </a:schemeClr>
+              </a:gs>
+              <a:gs pos="0">
+                <a:schemeClr val="tx1">
+                  <a:alpha val="0"/>
+                </a:schemeClr>
+              </a:gs>
+              <a:gs pos="100000">
+                <a:schemeClr val="tx1">
+                  <a:alpha val="90000"/>
+                </a:schemeClr>
+              </a:gs>
+            </a:gsLst>
+            <a:lin ang="10800000" scaled="0"/>
+          </a:gradFill>
+          <a:ln>
+            <a:noFill/>
+          </a:ln>
+        </p:spPr>
+        <p:style>
+          <a:lnRef idx="2">
+            <a:schemeClr val="accent1">
+              <a:shade val="50000"/>
+            </a:schemeClr>
+          </a:lnRef>
+          <a:fillRef idx="1">
+            <a:schemeClr val="accent1"/>
+          </a:fillRef>
+          <a:effectRef idx="0">
+            <a:schemeClr val="accent1"/>
+          </a:effectRef>
+          <a:fontRef idx="minor">
+            <a:schemeClr val="lt1"/>
+          </a:fontRef>
+        </p:style>
+        <p:txBody>
+          <a:bodyPr rtlCol="0" anchor="ctr"/>
+          <a:lstStyle/>
+          <a:p>
+            <a:pPr algn="ctr"/>
+            <a:endParaRPr lang="en-US" dirty="0"/>
+          </a:p>
+        </p:txBody>
+      </p:sp>
+      <p:sp>
+        <p:nvSpPr>
+          <p:cNvPr id="2" name="Title 1">
+            <a:extLst>
+              <a:ext uri="{FF2B5EF4-FFF2-40B4-BE49-F238E27FC236}">
+                <a16:creationId xmlns:a16="http://schemas.microsoft.com/office/drawing/2014/main" id="{453E2038-7E28-9F4A-9567-AF638A700FD1}"/>
+              </a:ext>
+            </a:extLst>
+          </p:cNvPr>
+          <p:cNvSpPr>
+            <a:spLocks noGrp="1"/>
+          </p:cNvSpPr>
+          <p:nvPr>
+            <p:ph type="title"/>
+          </p:nvPr>
+        </p:nvSpPr>
+        <p:spPr>
+          <a:xfrm>
+            <a:off x="303414" y="3091928"/>
+            <a:ext cx="6808922" cy="2387600"/>
+          </a:xfrm>
+        </p:spPr>
+        <p:style>
+          <a:lnRef idx="0">
+            <a:scrgbClr r="0" g="0" b="0"/>
+          </a:lnRef>
+          <a:fillRef idx="0">
+            <a:scrgbClr r="0" g="0" b="0"/>
+          </a:fillRef>
+          <a:effectRef idx="0">
+            <a:scrgbClr r="0" g="0" b="0"/>
+          </a:effectRef>
+          <a:fontRef idx="minor">
+            <a:schemeClr val="lt1"/>
+          </a:fontRef>
+        </p:style>
+        <p:txBody>
+          <a:bodyPr vert="horz" lIns="91440" tIns="45720" rIns="91440" bIns="45720" rtlCol="0" anchor="b">
+            <a:normAutofit/>
+          </a:bodyPr>
+          <a:lstStyle/>
+          <a:p>
+            <a:pPr defTabSz="914400"/>
+            <a:r>
+              <a:rPr lang="en-US" sz="5700" dirty="0">
+                <a:solidFill>
+                  <a:schemeClr val="bg1"/>
+                </a:solidFill>
+                <a:latin typeface="+mj-lt"/>
+                <a:ea typeface="+mj-ea"/>
+                <a:cs typeface="+mj-cs"/>
+              </a:rPr>
+              <a:t>       Multiagent Decision Making</a:t>
+            </a:r>
+          </a:p>
+        </p:txBody>
+      </p:sp>
+      <p:sp>
+        <p:nvSpPr>
+          <p:cNvPr id="1030" name="Rectangle: Rounded Corners 1029">
+            <a:extLst>
+              <a:ext uri="{FF2B5EF4-FFF2-40B4-BE49-F238E27FC236}">
+                <a16:creationId xmlns:a16="http://schemas.microsoft.com/office/drawing/2014/main" id="{79F40191-0F44-4FD1-82CC-ACB507C14BE6}"/>
+              </a:ext>
+              <a:ext uri="{C183D7F6-B498-43B3-948B-1728B52AA6E4}">
+                <adec:decorative xmlns:adec="http://schemas.microsoft.com/office/drawing/2017/decorative" val="1"/>
+              </a:ext>
+            </a:extLst>
+          </p:cNvPr>
+          <p:cNvSpPr>
+            <a:spLocks noGrp="1" noRot="1" noChangeAspect="1" noMove="1" noResize="1" noEditPoints="1" noAdjustHandles="1" noChangeArrowheads="1" noChangeShapeType="1" noTextEdit="1"/>
+          </p:cNvSpPr>
+          <p:nvPr>
+            <p:extLst>
+              <p:ext uri="{386F3935-93C4-4BCD-93E2-E3B085C9AB24}">
+                <p16:designElem xmlns:p16="http://schemas.microsoft.com/office/powerpoint/2015/main" val="1"/>
+              </p:ext>
+            </p:extLst>
+          </p:nvPr>
+        </p:nvSpPr>
+        <p:spPr>
+          <a:xfrm>
+            <a:off x="0" y="5575039"/>
+            <a:ext cx="7339422" cy="685800"/>
+          </a:xfrm>
+          <a:prstGeom prst="roundRect">
+            <a:avLst>
+              <a:gd name="adj" fmla="val 0"/>
+            </a:avLst>
+          </a:prstGeom>
+          <a:solidFill>
+            <a:schemeClr val="accent2"/>
+          </a:solidFill>
+          <a:ln>
+            <a:noFill/>
+          </a:ln>
+        </p:spPr>
+        <p:style>
+          <a:lnRef idx="2">
+            <a:schemeClr val="accent1">
+              <a:shade val="50000"/>
+            </a:schemeClr>
+          </a:lnRef>
+          <a:fillRef idx="1">
+            <a:schemeClr val="accent1"/>
+          </a:fillRef>
+          <a:effectRef idx="0">
+            <a:schemeClr val="accent1"/>
+          </a:effectRef>
+          <a:fontRef idx="minor">
+            <a:schemeClr val="lt1"/>
+          </a:fontRef>
+        </p:style>
+        <p:txBody>
+          <a:bodyPr rtlCol="0" anchor="ctr"/>
+          <a:lstStyle/>
+          <a:p>
+            <a:pPr algn="ctr"/>
+            <a:endParaRPr lang="en-US"/>
+          </a:p>
+        </p:txBody>
+      </p:sp>
+      <p:sp>
+        <p:nvSpPr>
+          <p:cNvPr id="4" name="Content Placeholder 3">
+            <a:extLst>
+              <a:ext uri="{FF2B5EF4-FFF2-40B4-BE49-F238E27FC236}">
+                <a16:creationId xmlns:a16="http://schemas.microsoft.com/office/drawing/2014/main" id="{A997472D-39A4-C55C-9841-2BDAF9ABE556}"/>
+              </a:ext>
+            </a:extLst>
+          </p:cNvPr>
+          <p:cNvSpPr>
+            <a:spLocks noGrp="1"/>
+          </p:cNvSpPr>
+          <p:nvPr>
+            <p:ph idx="1"/>
+          </p:nvPr>
+        </p:nvSpPr>
+        <p:spPr>
+          <a:xfrm>
+            <a:off x="303414" y="5624945"/>
+            <a:ext cx="6808922" cy="592975"/>
+          </a:xfrm>
+        </p:spPr>
+        <p:txBody>
+          <a:bodyPr vert="horz" lIns="91440" tIns="45720" rIns="91440" bIns="45720" rtlCol="0" anchor="ctr">
+            <a:normAutofit/>
+          </a:bodyPr>
+          <a:lstStyle/>
+          <a:p>
+            <a:pPr marL="0" indent="0" defTabSz="914400">
+              <a:spcBef>
+                <a:spcPts val="1000"/>
+              </a:spcBef>
+              <a:buNone/>
+            </a:pPr>
+            <a:r>
+              <a:rPr lang="en-US" sz="2400">
+                <a:solidFill>
+                  <a:schemeClr val="bg1"/>
+                </a:solidFill>
+              </a:rPr>
+              <a:t>Communication and Coordination</a:t>
+            </a:r>
+          </a:p>
+        </p:txBody>
+      </p:sp>
+    </p:spTree>
+    <p:extLst>
+      <p:ext uri="{BB962C8B-B14F-4D97-AF65-F5344CB8AC3E}">
+        <p14:creationId xmlns:p14="http://schemas.microsoft.com/office/powerpoint/2010/main" val="3032324153"/>
+      </p:ext>
+    </p:extLst>
+  </p:cSld>
+  <p:clrMapOvr>
+    <a:masterClrMapping/>
+  </p:clrMapOvr>
+</p:sld>
+</file>
+
+<file path=ppt/slides/slide7.xml><?xml version="1.0" encoding="utf-8"?>
+<p:sld xmlns:a="http://schemas.openxmlformats.org/drawingml/2006/main" xmlns:r="http://schemas.openxmlformats.org/officeDocument/2006/relationships" xmlns:p="http://schemas.openxmlformats.org/presentationml/2006/main">
+  <p:cSld>
+    <p:bg>
+      <p:bgPr>
+        <a:solidFill>
+          <a:srgbClr val="000000"/>
+        </a:solidFill>
+        <a:effectLst/>
+      </p:bgPr>
+    </p:bg>
+    <p:spTree>
+      <p:nvGrpSpPr>
+        <p:cNvPr id="1" name=""/>
+        <p:cNvGrpSpPr/>
+        <p:nvPr/>
+      </p:nvGrpSpPr>
+      <p:grpSpPr>
+        <a:xfrm>
+          <a:off x="0" y="0"/>
+          <a:ext cx="0" cy="0"/>
+          <a:chOff x="0" y="0"/>
+          <a:chExt cx="0" cy="0"/>
+        </a:xfrm>
+      </p:grpSpPr>
+      <p:sp>
+        <p:nvSpPr>
+          <p:cNvPr id="3081" name="Rectangle 3080">
+            <a:extLst>
+              <a:ext uri="{FF2B5EF4-FFF2-40B4-BE49-F238E27FC236}">
+                <a16:creationId xmlns:a16="http://schemas.microsoft.com/office/drawing/2014/main" id="{71B2258F-86CA-4D4D-8270-BC05FCDEBFB3}"/>
+              </a:ext>
+              <a:ext uri="{C183D7F6-B498-43B3-948B-1728B52AA6E4}">
+                <adec:decorative xmlns:adec="http://schemas.microsoft.com/office/drawing/2017/decorative" val="1"/>
+              </a:ext>
+            </a:extLst>
+          </p:cNvPr>
+          <p:cNvSpPr>
+            <a:spLocks noGrp="1" noRot="1" noChangeAspect="1" noMove="1" noResize="1" noEditPoints="1" noAdjustHandles="1" noChangeArrowheads="1" noChangeShapeType="1" noTextEdit="1"/>
+          </p:cNvSpPr>
+          <p:nvPr>
+            <p:extLst>
+              <p:ext uri="{386F3935-93C4-4BCD-93E2-E3B085C9AB24}">
+                <p16:designElem xmlns:p16="http://schemas.microsoft.com/office/powerpoint/2015/main" val="1"/>
+              </p:ext>
+            </p:extLst>
+          </p:nvPr>
+        </p:nvSpPr>
+        <p:spPr>
+          <a:xfrm>
+            <a:off x="0" y="0"/>
+            <a:ext cx="9144000" cy="6857999"/>
+          </a:xfrm>
+          <a:prstGeom prst="rect">
+            <a:avLst/>
+          </a:prstGeom>
+          <a:solidFill>
+            <a:srgbClr val="000000"/>
+          </a:solidFill>
+          <a:ln>
+            <a:noFill/>
+          </a:ln>
+        </p:spPr>
+        <p:style>
+          <a:lnRef idx="2">
+            <a:schemeClr val="accent1">
+              <a:shade val="50000"/>
+            </a:schemeClr>
+          </a:lnRef>
+          <a:fillRef idx="1">
+            <a:schemeClr val="accent1"/>
+          </a:fillRef>
+          <a:effectRef idx="0">
+            <a:schemeClr val="accent1"/>
+          </a:effectRef>
+          <a:fontRef idx="minor">
+            <a:schemeClr val="lt1"/>
+          </a:fontRef>
+        </p:style>
+        <p:txBody>
+          <a:bodyPr rtlCol="0" anchor="ctr"/>
+          <a:lstStyle/>
+          <a:p>
+            <a:pPr algn="ctr"/>
+            <a:endParaRPr lang="en-US"/>
+          </a:p>
+        </p:txBody>
+      </p:sp>
+      <p:pic>
+        <p:nvPicPr>
+          <p:cNvPr id="3076" name="Picture 4">
+            <a:extLst>
+              <a:ext uri="{FF2B5EF4-FFF2-40B4-BE49-F238E27FC236}">
+                <a16:creationId xmlns:a16="http://schemas.microsoft.com/office/drawing/2014/main" id="{712EED6F-8A32-71B3-A013-4263C5B0132F}"/>
+              </a:ext>
+              <a:ext uri="{C183D7F6-B498-43B3-948B-1728B52AA6E4}">
+                <adec:decorative xmlns:adec="http://schemas.microsoft.com/office/drawing/2017/decorative" val="1"/>
+              </a:ext>
+            </a:extLst>
+          </p:cNvPr>
+          <p:cNvPicPr>
+            <a:picLocks noChangeAspect="1" noChangeArrowheads="1"/>
+          </p:cNvPicPr>
+          <p:nvPr/>
+        </p:nvPicPr>
+        <p:blipFill>
+          <a:blip r:embed="rId2">
+            <a:alphaModFix amt="50000"/>
+            <a:extLst>
+              <a:ext uri="{28A0092B-C50C-407E-A947-70E740481C1C}">
+                <a14:useLocalDpi xmlns:a14="http://schemas.microsoft.com/office/drawing/2010/main" val="0"/>
+              </a:ext>
+            </a:extLst>
+          </a:blip>
+          <a:srcRect l="14042" r="10958"/>
+          <a:stretch/>
+        </p:blipFill>
+        <p:spPr bwMode="auto">
+          <a:xfrm>
+            <a:off x="20" y="1"/>
+            <a:ext cx="9143980" cy="6857999"/>
           </a:xfrm>
           <a:prstGeom prst="rect">
             <a:avLst/>
@@ -8989,7 +10048,7 @@
           <p:cNvPr id="2" name="Title 1">
             <a:extLst>
               <a:ext uri="{FF2B5EF4-FFF2-40B4-BE49-F238E27FC236}">
-                <a16:creationId xmlns:a16="http://schemas.microsoft.com/office/drawing/2014/main" id="{C44D7C84-B190-4132-AEAB-D61B1E6C4E9B}"/>
+                <a16:creationId xmlns:a16="http://schemas.microsoft.com/office/drawing/2014/main" id="{EC169811-CA11-AA5B-AC37-2CE8BD3263F5}"/>
               </a:ext>
             </a:extLst>
           </p:cNvPr>
@@ -9002,26 +10061,24 @@
         </p:nvSpPr>
         <p:spPr>
           <a:xfrm>
-            <a:off x="0" y="228600"/>
-            <a:ext cx="7924800" cy="854074"/>
+            <a:off x="1143000" y="1122362"/>
+            <a:ext cx="6858000" cy="2900518"/>
           </a:xfrm>
-          <a:solidFill>
-            <a:srgbClr val="000000">
-              <a:alpha val="58039"/>
-            </a:srgbClr>
-          </a:solidFill>
         </p:spPr>
         <p:txBody>
-          <a:bodyPr/>
+          <a:bodyPr vert="horz" lIns="91440" tIns="45720" rIns="91440" bIns="45720" rtlCol="0" anchor="b">
+            <a:normAutofit/>
+          </a:bodyPr>
           <a:lstStyle/>
           <a:p>
-            <a:r>
-              <a:rPr lang="en-US" b="1" dirty="0">
+            <a:pPr algn="ctr" defTabSz="914400"/>
+            <a:r>
+              <a:rPr lang="en-US" sz="6000">
                 <a:solidFill>
-                  <a:schemeClr val="bg1"/>
+                  <a:srgbClr val="FFFFFF"/>
                 </a:solidFill>
               </a:rPr>
-              <a:t>  Robotics</a:t>
+              <a:t>Conclusion</a:t>
             </a:r>
           </a:p>
         </p:txBody>
@@ -9031,7 +10088,7 @@
           <p:cNvPr id="3" name="Content Placeholder 2">
             <a:extLst>
               <a:ext uri="{FF2B5EF4-FFF2-40B4-BE49-F238E27FC236}">
-                <a16:creationId xmlns:a16="http://schemas.microsoft.com/office/drawing/2014/main" id="{18A0DFC2-A097-4722-ACFA-ADD8C82A0CA2}"/>
+                <a16:creationId xmlns:a16="http://schemas.microsoft.com/office/drawing/2014/main" id="{EC4A2FCB-D7D3-C5B0-7F50-195945686363}"/>
               </a:ext>
             </a:extLst>
           </p:cNvPr>
@@ -9044,23 +10101,44 @@
         </p:nvSpPr>
         <p:spPr>
           <a:xfrm>
-            <a:off x="1981200" y="514746"/>
-            <a:ext cx="5486400" cy="281781"/>
+            <a:off x="1143000" y="4159404"/>
+            <a:ext cx="6858000" cy="1098395"/>
           </a:xfrm>
         </p:spPr>
         <p:txBody>
-          <a:bodyPr>
-            <a:normAutofit fontScale="70000" lnSpcReduction="20000"/>
+          <a:bodyPr vert="horz" lIns="91440" tIns="45720" rIns="91440" bIns="45720" rtlCol="0">
+            <a:normAutofit/>
           </a:bodyPr>
           <a:lstStyle/>
           <a:p>
-            <a:r>
-              <a:rPr lang="en-US" dirty="0">
+            <a:pPr marL="0" indent="0" algn="ctr" defTabSz="914400">
+              <a:spcBef>
+                <a:spcPts val="1000"/>
+              </a:spcBef>
+              <a:buNone/>
+            </a:pPr>
+            <a:r>
+              <a:rPr lang="en-US" sz="2400" dirty="0">
                 <a:solidFill>
-                  <a:schemeClr val="bg1"/>
+                  <a:srgbClr val="FFFFFF"/>
                 </a:solidFill>
               </a:rPr>
-              <a:t>Hardware, sensors, control theory (feedback-based controllers)</a:t>
+              <a:t>AI development is currently moving </a:t>
+            </a:r>
+            <a:br>
+              <a:rPr lang="en-US" sz="2400" dirty="0">
+                <a:solidFill>
+                  <a:srgbClr val="FFFFFF"/>
+                </a:solidFill>
+              </a:rPr>
+            </a:br>
+            <a:r>
+              <a:rPr lang="en-US" sz="2400" dirty="0">
+                <a:solidFill>
+                  <a:srgbClr val="FFFFFF"/>
+                </a:solidFill>
+              </a:rPr>
+              <a:t>at the speed of light!</a:t>
             </a:r>
           </a:p>
         </p:txBody>
@@ -9068,12 +10146,12 @@
     </p:spTree>
     <p:extLst>
       <p:ext uri="{BB962C8B-B14F-4D97-AF65-F5344CB8AC3E}">
-        <p14:creationId xmlns:p14="http://schemas.microsoft.com/office/powerpoint/2010/main" val="4189258210"/>
+        <p14:creationId xmlns:p14="http://schemas.microsoft.com/office/powerpoint/2010/main" val="4215643003"/>
       </p:ext>
     </p:extLst>
   </p:cSld>
   <p:clrMapOvr>
-    <a:masterClrMapping/>
+    <a:overrideClrMapping bg1="dk1" tx1="lt1" bg2="dk2" tx2="lt2" accent1="accent1" accent2="accent2" accent3="accent3" accent4="accent4" accent5="accent5" accent6="accent6" hlink="hlink" folHlink="folHlink"/>
   </p:clrMapOvr>
 </p:sld>
 </file>

</xml_diff>